<commit_message>
Updated DOE, parameter fitting, and cross validaiton
</commit_message>
<xml_diff>
--- a/Lectures/Design-Of-Experiments/doe_programming.pptx
+++ b/Lectures/Design-Of-Experiments/doe_programming.pptx
@@ -296,7 +296,7 @@
               <a:pPr>
                 <a:defRPr/>
               </a:pPr>
-              <a:t>11/1/23</a:t>
+              <a:t>11/8/23</a:t>
             </a:fld>
             <a:endParaRPr lang="en-US" altLang="x-none"/>
           </a:p>
@@ -505,7 +505,7 @@
               <a:pPr>
                 <a:defRPr/>
               </a:pPr>
-              <a:t>11/1/23</a:t>
+              <a:t>11/8/23</a:t>
             </a:fld>
             <a:endParaRPr lang="en-US" altLang="x-none"/>
           </a:p>
@@ -9455,8 +9455,8 @@
           </a:p>
         </p:txBody>
       </p:sp>
-      <mc:AlternateContent xmlns:mc="http://schemas.openxmlformats.org/markup-compatibility/2006">
-        <mc:Choice xmlns:a14="http://schemas.microsoft.com/office/drawing/2010/main" Requires="a14">
+      <mc:AlternateContent xmlns:mc="http://schemas.openxmlformats.org/markup-compatibility/2006" xmlns:a14="http://schemas.microsoft.com/office/drawing/2010/main">
+        <mc:Choice Requires="a14">
           <p:sp>
             <p:nvSpPr>
               <p:cNvPr id="7" name="TextBox 6">
@@ -9521,7 +9521,7 @@
             </p:txBody>
           </p:sp>
         </mc:Choice>
-        <mc:Fallback>
+        <mc:Fallback xmlns="">
           <p:sp>
             <p:nvSpPr>
               <p:cNvPr id="7" name="TextBox 6">
@@ -10020,8 +10020,8 @@
           </p:sp>
         </mc:Fallback>
       </mc:AlternateContent>
-      <mc:AlternateContent xmlns:mc="http://schemas.openxmlformats.org/markup-compatibility/2006">
-        <mc:Choice xmlns:a14="http://schemas.microsoft.com/office/drawing/2010/main" Requires="a14">
+      <mc:AlternateContent xmlns:mc="http://schemas.openxmlformats.org/markup-compatibility/2006" xmlns:a14="http://schemas.microsoft.com/office/drawing/2010/main">
+        <mc:Choice Requires="a14">
           <p:sp>
             <p:nvSpPr>
               <p:cNvPr id="30" name="TextBox 29">
@@ -10195,7 +10195,7 @@
             </p:txBody>
           </p:sp>
         </mc:Choice>
-        <mc:Fallback>
+        <mc:Fallback xmlns="">
           <p:sp>
             <p:nvSpPr>
               <p:cNvPr id="30" name="TextBox 29">
@@ -10240,8 +10240,8 @@
           </p:sp>
         </mc:Fallback>
       </mc:AlternateContent>
-      <mc:AlternateContent xmlns:mc="http://schemas.openxmlformats.org/markup-compatibility/2006">
-        <mc:Choice xmlns:a14="http://schemas.microsoft.com/office/drawing/2010/main" Requires="a14">
+      <mc:AlternateContent xmlns:mc="http://schemas.openxmlformats.org/markup-compatibility/2006" xmlns:a14="http://schemas.microsoft.com/office/drawing/2010/main">
+        <mc:Choice Requires="a14">
           <p:sp>
             <p:nvSpPr>
               <p:cNvPr id="14" name="TextBox 13">
@@ -10625,7 +10625,7 @@
             </p:txBody>
           </p:sp>
         </mc:Choice>
-        <mc:Fallback>
+        <mc:Fallback xmlns="">
           <p:sp>
             <p:nvSpPr>
               <p:cNvPr id="14" name="TextBox 13">
@@ -12536,7 +12536,7 @@
               <p:spPr>
                 <a:xfrm>
                   <a:off x="5213584" y="1087762"/>
-                  <a:ext cx="3679725" cy="394210"/>
+                  <a:ext cx="3735831" cy="394210"/>
                 </a:xfrm>
                 <a:prstGeom prst="rect">
                   <a:avLst/>
@@ -12568,7 +12568,7 @@
                             <a:rPr lang="en-US" b="1" i="1" smtClean="0">
                               <a:latin typeface="Cambria Math" panose="02040503050406030204" pitchFamily="18" charset="0"/>
                             </a:rPr>
-                            <m:t>𝜶</m:t>
+                            <m:t>𝒚</m:t>
                           </m:r>
                         </m:e>
                         <m:sub>
@@ -12642,7 +12642,7 @@
               <p:spPr>
                 <a:xfrm>
                   <a:off x="5213584" y="1087762"/>
-                  <a:ext cx="3679725" cy="394210"/>
+                  <a:ext cx="3735831" cy="394210"/>
                 </a:xfrm>
                 <a:prstGeom prst="rect">
                   <a:avLst/>
@@ -12650,7 +12650,7 @@
                 <a:blipFill>
                   <a:blip r:embed="rId4"/>
                   <a:stretch>
-                    <a:fillRect l="-1724" t="-9375" b="-15625"/>
+                    <a:fillRect l="-1695" t="-9375" b="-15625"/>
                   </a:stretch>
                 </a:blipFill>
               </p:spPr>
@@ -13570,8 +13570,8 @@
           </a:p>
         </p:txBody>
       </p:sp>
-      <mc:AlternateContent xmlns:mc="http://schemas.openxmlformats.org/markup-compatibility/2006">
-        <mc:Choice xmlns:a14="http://schemas.microsoft.com/office/drawing/2010/main" Requires="a14">
+      <mc:AlternateContent xmlns:mc="http://schemas.openxmlformats.org/markup-compatibility/2006" xmlns:a14="http://schemas.microsoft.com/office/drawing/2010/main">
+        <mc:Choice Requires="a14">
           <p:sp>
             <p:nvSpPr>
               <p:cNvPr id="7" name="TextBox 6">
@@ -13675,7 +13675,7 @@
             </p:txBody>
           </p:sp>
         </mc:Choice>
-        <mc:Fallback>
+        <mc:Fallback xmlns="">
           <p:sp>
             <p:nvSpPr>
               <p:cNvPr id="7" name="TextBox 6">
@@ -34354,67 +34354,295 @@
           </a:p>
         </p:txBody>
       </p:sp>
-      <p:sp>
-        <p:nvSpPr>
-          <p:cNvPr id="5" name="Content Placeholder 4">
-            <a:extLst>
-              <a:ext uri="{FF2B5EF4-FFF2-40B4-BE49-F238E27FC236}">
-                <a16:creationId xmlns:a16="http://schemas.microsoft.com/office/drawing/2014/main" id="{4FF731EF-1DE2-9124-250B-5137B53D4026}"/>
-              </a:ext>
-            </a:extLst>
-          </p:cNvPr>
-          <p:cNvSpPr>
-            <a:spLocks noGrp="1"/>
-          </p:cNvSpPr>
-          <p:nvPr>
-            <p:ph idx="1"/>
-          </p:nvPr>
-        </p:nvSpPr>
-        <p:spPr/>
-        <p:txBody>
-          <a:bodyPr/>
-          <a:lstStyle/>
-          <a:p>
-            <a:r>
-              <a:rPr lang="en-US" dirty="0"/>
-              <a:t>Programming</a:t>
-            </a:r>
-          </a:p>
-          <a:p>
-            <a:pPr lvl="1"/>
-            <a:r>
-              <a:rPr lang="en-US" dirty="0"/>
-              <a:t>Argument (input to a function)</a:t>
-            </a:r>
-          </a:p>
-          <a:p>
-            <a:r>
-              <a:rPr lang="en-US" dirty="0"/>
-              <a:t>Biochemical model</a:t>
-            </a:r>
-          </a:p>
-          <a:p>
-            <a:pPr lvl="1"/>
-            <a:r>
-              <a:rPr lang="en-US" dirty="0"/>
-              <a:t>Species (molecule), reaction, kinetic constant</a:t>
-            </a:r>
-          </a:p>
-          <a:p>
-            <a:r>
-              <a:rPr lang="en-US" dirty="0"/>
-              <a:t>Design of experiments (DOE)</a:t>
-            </a:r>
-          </a:p>
-          <a:p>
-            <a:pPr lvl="1"/>
-            <a:r>
-              <a:rPr lang="en-US" dirty="0"/>
-              <a:t>Factor, level, response, condition/experiment</a:t>
-            </a:r>
-          </a:p>
-        </p:txBody>
-      </p:sp>
+      <mc:AlternateContent xmlns:mc="http://schemas.openxmlformats.org/markup-compatibility/2006">
+        <mc:Choice xmlns:a14="http://schemas.microsoft.com/office/drawing/2010/main" Requires="a14">
+          <p:sp>
+            <p:nvSpPr>
+              <p:cNvPr id="5" name="Content Placeholder 4">
+                <a:extLst>
+                  <a:ext uri="{FF2B5EF4-FFF2-40B4-BE49-F238E27FC236}">
+                    <a16:creationId xmlns:a16="http://schemas.microsoft.com/office/drawing/2014/main" id="{4FF731EF-1DE2-9124-250B-5137B53D4026}"/>
+                  </a:ext>
+                </a:extLst>
+              </p:cNvPr>
+              <p:cNvSpPr>
+                <a:spLocks noGrp="1"/>
+              </p:cNvSpPr>
+              <p:nvPr>
+                <p:ph idx="1"/>
+              </p:nvPr>
+            </p:nvSpPr>
+            <p:spPr/>
+            <p:txBody>
+              <a:bodyPr/>
+              <a:lstStyle/>
+              <a:p>
+                <a:r>
+                  <a:rPr lang="en-US" dirty="0"/>
+                  <a:t>Programming</a:t>
+                </a:r>
+              </a:p>
+              <a:p>
+                <a:pPr lvl="1"/>
+                <a:r>
+                  <a:rPr lang="en-US" dirty="0"/>
+                  <a:t>Argument (input to a function)</a:t>
+                </a:r>
+              </a:p>
+              <a:p>
+                <a:r>
+                  <a:rPr lang="en-US" dirty="0"/>
+                  <a:t>Biochemical model</a:t>
+                </a:r>
+              </a:p>
+              <a:p>
+                <a:pPr lvl="1"/>
+                <a:r>
+                  <a:rPr lang="en-US" dirty="0"/>
+                  <a:t>Species (molecule), reaction, kinetic constant</a:t>
+                </a:r>
+              </a:p>
+              <a:p>
+                <a:r>
+                  <a:rPr lang="en-US" dirty="0"/>
+                  <a:t>Design of experiments (DOE)</a:t>
+                </a:r>
+              </a:p>
+              <a:p>
+                <a:pPr lvl="1"/>
+                <a:r>
+                  <a:rPr lang="en-US" dirty="0"/>
+                  <a:t>Factor, level, response, condition/experiment</a:t>
+                </a:r>
+              </a:p>
+              <a:p>
+                <a:pPr lvl="1"/>
+                <a:r>
+                  <a:rPr lang="en-US" dirty="0"/>
+                  <a:t>Parameters of DOE: </a:t>
+                </a:r>
+                <a14:m>
+                  <m:oMath xmlns:m="http://schemas.openxmlformats.org/officeDocument/2006/math">
+                    <m:r>
+                      <a:rPr lang="en-US" b="0" i="1" smtClean="0">
+                        <a:latin typeface="Cambria Math" panose="02040503050406030204" pitchFamily="18" charset="0"/>
+                      </a:rPr>
+                      <m:t>𝜇</m:t>
+                    </m:r>
+                    <m:r>
+                      <a:rPr lang="en-US" b="0" i="1" smtClean="0">
+                        <a:latin typeface="Cambria Math" panose="02040503050406030204" pitchFamily="18" charset="0"/>
+                      </a:rPr>
+                      <m:t>, </m:t>
+                    </m:r>
+                    <m:sSub>
+                      <m:sSubPr>
+                        <m:ctrlPr>
+                          <a:rPr lang="en-US" b="0" i="1" smtClean="0">
+                            <a:latin typeface="Cambria Math" panose="02040503050406030204" pitchFamily="18" charset="0"/>
+                          </a:rPr>
+                        </m:ctrlPr>
+                      </m:sSubPr>
+                      <m:e>
+                        <m:r>
+                          <a:rPr lang="en-US" b="0" i="1" smtClean="0">
+                            <a:latin typeface="Cambria Math" panose="02040503050406030204" pitchFamily="18" charset="0"/>
+                          </a:rPr>
+                          <m:t>𝛼</m:t>
+                        </m:r>
+                      </m:e>
+                      <m:sub>
+                        <m:r>
+                          <a:rPr lang="en-US" b="0" i="1" smtClean="0">
+                            <a:latin typeface="Cambria Math" panose="02040503050406030204" pitchFamily="18" charset="0"/>
+                          </a:rPr>
+                          <m:t>𝑖</m:t>
+                        </m:r>
+                        <m:r>
+                          <a:rPr lang="en-US" b="0" i="1" smtClean="0">
+                            <a:latin typeface="Cambria Math" panose="02040503050406030204" pitchFamily="18" charset="0"/>
+                          </a:rPr>
+                          <m:t>,</m:t>
+                        </m:r>
+                        <m:sSub>
+                          <m:sSubPr>
+                            <m:ctrlPr>
+                              <a:rPr lang="en-US" b="0" i="1" smtClean="0">
+                                <a:latin typeface="Cambria Math" panose="02040503050406030204" pitchFamily="18" charset="0"/>
+                              </a:rPr>
+                            </m:ctrlPr>
+                          </m:sSubPr>
+                          <m:e>
+                            <m:r>
+                              <a:rPr lang="en-US" b="0" i="1" smtClean="0">
+                                <a:latin typeface="Cambria Math" panose="02040503050406030204" pitchFamily="18" charset="0"/>
+                              </a:rPr>
+                              <m:t>𝑖</m:t>
+                            </m:r>
+                          </m:e>
+                          <m:sub>
+                            <m:r>
+                              <a:rPr lang="en-US" b="0" i="1" smtClean="0">
+                                <a:latin typeface="Cambria Math" panose="02040503050406030204" pitchFamily="18" charset="0"/>
+                              </a:rPr>
+                              <m:t>𝑘</m:t>
+                            </m:r>
+                          </m:sub>
+                        </m:sSub>
+                      </m:sub>
+                    </m:sSub>
+                    <m:r>
+                      <a:rPr lang="en-US" b="0" i="1" smtClean="0">
+                        <a:latin typeface="Cambria Math" panose="02040503050406030204" pitchFamily="18" charset="0"/>
+                      </a:rPr>
+                      <m:t>,</m:t>
+                    </m:r>
+                    <m:sSub>
+                      <m:sSubPr>
+                        <m:ctrlPr>
+                          <a:rPr lang="en-US" b="0" i="1" smtClean="0">
+                            <a:latin typeface="Cambria Math" panose="02040503050406030204" pitchFamily="18" charset="0"/>
+                          </a:rPr>
+                        </m:ctrlPr>
+                      </m:sSubPr>
+                      <m:e>
+                        <m:r>
+                          <a:rPr lang="en-US" b="0" i="1" smtClean="0">
+                            <a:latin typeface="Cambria Math" panose="02040503050406030204" pitchFamily="18" charset="0"/>
+                          </a:rPr>
+                          <m:t>𝛽</m:t>
+                        </m:r>
+                      </m:e>
+                      <m:sub>
+                        <m:r>
+                          <a:rPr lang="en-US" b="0" i="1" smtClean="0">
+                            <a:latin typeface="Cambria Math" panose="02040503050406030204" pitchFamily="18" charset="0"/>
+                          </a:rPr>
+                          <m:t>𝑖</m:t>
+                        </m:r>
+                        <m:r>
+                          <a:rPr lang="en-US" b="0" i="1" smtClean="0">
+                            <a:latin typeface="Cambria Math" panose="02040503050406030204" pitchFamily="18" charset="0"/>
+                          </a:rPr>
+                          <m:t>,</m:t>
+                        </m:r>
+                        <m:sSub>
+                          <m:sSubPr>
+                            <m:ctrlPr>
+                              <a:rPr lang="en-US" b="0" i="1" smtClean="0">
+                                <a:latin typeface="Cambria Math" panose="02040503050406030204" pitchFamily="18" charset="0"/>
+                              </a:rPr>
+                            </m:ctrlPr>
+                          </m:sSubPr>
+                          <m:e>
+                            <m:r>
+                              <a:rPr lang="en-US" b="0" i="1" smtClean="0">
+                                <a:latin typeface="Cambria Math" panose="02040503050406030204" pitchFamily="18" charset="0"/>
+                              </a:rPr>
+                              <m:t>𝑖</m:t>
+                            </m:r>
+                          </m:e>
+                          <m:sub>
+                            <m:r>
+                              <a:rPr lang="en-US" b="0" i="1" smtClean="0">
+                                <a:latin typeface="Cambria Math" panose="02040503050406030204" pitchFamily="18" charset="0"/>
+                              </a:rPr>
+                              <m:t>𝑘</m:t>
+                            </m:r>
+                          </m:sub>
+                        </m:sSub>
+                        <m:r>
+                          <a:rPr lang="en-US" b="0" i="1" smtClean="0">
+                            <a:latin typeface="Cambria Math" panose="02040503050406030204" pitchFamily="18" charset="0"/>
+                          </a:rPr>
+                          <m:t>,</m:t>
+                        </m:r>
+                        <m:r>
+                          <a:rPr lang="en-US" b="0" i="1" smtClean="0">
+                            <a:latin typeface="Cambria Math" panose="02040503050406030204" pitchFamily="18" charset="0"/>
+                          </a:rPr>
+                          <m:t>𝑗</m:t>
+                        </m:r>
+                        <m:r>
+                          <a:rPr lang="en-US" b="0" i="1" smtClean="0">
+                            <a:latin typeface="Cambria Math" panose="02040503050406030204" pitchFamily="18" charset="0"/>
+                          </a:rPr>
+                          <m:t>,</m:t>
+                        </m:r>
+                        <m:sSub>
+                          <m:sSubPr>
+                            <m:ctrlPr>
+                              <a:rPr lang="en-US" b="0" i="1" smtClean="0">
+                                <a:latin typeface="Cambria Math" panose="02040503050406030204" pitchFamily="18" charset="0"/>
+                              </a:rPr>
+                            </m:ctrlPr>
+                          </m:sSubPr>
+                          <m:e>
+                            <m:r>
+                              <a:rPr lang="en-US" b="0" i="1" smtClean="0">
+                                <a:latin typeface="Cambria Math" panose="02040503050406030204" pitchFamily="18" charset="0"/>
+                              </a:rPr>
+                              <m:t>𝑗</m:t>
+                            </m:r>
+                          </m:e>
+                          <m:sub>
+                            <m:r>
+                              <a:rPr lang="en-US" b="0" i="1" smtClean="0">
+                                <a:latin typeface="Cambria Math" panose="02040503050406030204" pitchFamily="18" charset="0"/>
+                              </a:rPr>
+                              <m:t>𝑘</m:t>
+                            </m:r>
+                          </m:sub>
+                        </m:sSub>
+                      </m:sub>
+                    </m:sSub>
+                  </m:oMath>
+                </a14:m>
+                <a:endParaRPr lang="en-US" dirty="0"/>
+              </a:p>
+            </p:txBody>
+          </p:sp>
+        </mc:Choice>
+        <mc:Fallback>
+          <p:sp>
+            <p:nvSpPr>
+              <p:cNvPr id="5" name="Content Placeholder 4">
+                <a:extLst>
+                  <a:ext uri="{FF2B5EF4-FFF2-40B4-BE49-F238E27FC236}">
+                    <a16:creationId xmlns:a16="http://schemas.microsoft.com/office/drawing/2014/main" id="{4FF731EF-1DE2-9124-250B-5137B53D4026}"/>
+                  </a:ext>
+                </a:extLst>
+              </p:cNvPr>
+              <p:cNvSpPr>
+                <a:spLocks noGrp="1" noRot="1" noChangeAspect="1" noMove="1" noResize="1" noEditPoints="1" noAdjustHandles="1" noChangeArrowheads="1" noChangeShapeType="1" noTextEdit="1"/>
+              </p:cNvSpPr>
+              <p:nvPr>
+                <p:ph idx="1"/>
+              </p:nvPr>
+            </p:nvSpPr>
+            <p:spPr>
+              <a:blipFill>
+                <a:blip r:embed="rId2"/>
+                <a:stretch>
+                  <a:fillRect l="-1080" t="-1108"/>
+                </a:stretch>
+              </a:blipFill>
+            </p:spPr>
+            <p:txBody>
+              <a:bodyPr/>
+              <a:lstStyle/>
+              <a:p>
+                <a:r>
+                  <a:rPr lang="en-US">
+                    <a:noFill/>
+                  </a:rPr>
+                  <a:t> </a:t>
+                </a:r>
+              </a:p>
+            </p:txBody>
+          </p:sp>
+        </mc:Fallback>
+      </mc:AlternateContent>
       <p:sp>
         <p:nvSpPr>
           <p:cNvPr id="3" name="Slide Number Placeholder 2">
@@ -34447,6 +34675,38 @@
               <a:t>9</a:t>
             </a:fld>
             <a:endParaRPr lang="en-US" altLang="x-none"/>
+          </a:p>
+        </p:txBody>
+      </p:sp>
+      <p:sp>
+        <p:nvSpPr>
+          <p:cNvPr id="4" name="TextBox 3">
+            <a:extLst>
+              <a:ext uri="{FF2B5EF4-FFF2-40B4-BE49-F238E27FC236}">
+                <a16:creationId xmlns:a16="http://schemas.microsoft.com/office/drawing/2014/main" id="{CD86F500-03BB-67EA-2526-81B46B410A39}"/>
+              </a:ext>
+            </a:extLst>
+          </p:cNvPr>
+          <p:cNvSpPr txBox="1"/>
+          <p:nvPr/>
+        </p:nvSpPr>
+        <p:spPr>
+          <a:xfrm>
+            <a:off x="6918036" y="3777673"/>
+            <a:ext cx="184731" cy="369332"/>
+          </a:xfrm>
+          <a:prstGeom prst="rect">
+            <a:avLst/>
+          </a:prstGeom>
+          <a:noFill/>
+        </p:spPr>
+        <p:txBody>
+          <a:bodyPr wrap="none" rtlCol="0">
+            <a:spAutoFit/>
+          </a:bodyPr>
+          <a:lstStyle/>
+          <a:p>
+            <a:endParaRPr lang="en-US" dirty="0"/>
           </a:p>
         </p:txBody>
       </p:sp>

</xml_diff>